<commit_message>
Fixed slide 4 of the presentation.
</commit_message>
<xml_diff>
--- a/Presentation/BV_AM_Final_Project_Presentation.pptx
+++ b/Presentation/BV_AM_Final_Project_Presentation.pptx
@@ -174,7 +174,7 @@
       </p14:sectionLst>
     </p:ext>
     <p:ext uri="{EFAFB233-063F-42B5-8137-9DF3F51BA10A}">
-      <p15:sldGuideLst xmlns:p15="http://schemas.microsoft.com/office/powerpoint/2012/main" xmlns="">
+      <p15:sldGuideLst xmlns="" xmlns:p15="http://schemas.microsoft.com/office/powerpoint/2012/main">
         <p15:guide id="1" orient="horz" pos="2160">
           <p15:clr>
             <a:srgbClr val="A4A3A4"/>
@@ -7994,11 +7994,7 @@
             </a:pPr>
             <a:r>
               <a:rPr lang="en-US" dirty="0" smtClean="0"/>
-              <a:t>Aaron </a:t>
-            </a:r>
-            <a:r>
-              <a:rPr lang="en-US" dirty="0" smtClean="0"/>
-              <a:t>Mills, Blake Vermeer</a:t>
+              <a:t>Aaron Mills, Blake Vermeer</a:t>
             </a:r>
             <a:endParaRPr lang="en-US" dirty="0"/>
           </a:p>
@@ -10090,19 +10086,13 @@
           <a:p>
             <a:r>
               <a:rPr lang="en-US" dirty="0" smtClean="0"/>
-              <a:t>User Logic contains 32 registers</a:t>
-            </a:r>
-          </a:p>
-          <a:p>
+              <a:t>User Logic contains 32 </a:t>
+            </a:r>
             <a:r>
               <a:rPr lang="en-US" dirty="0" smtClean="0"/>
-              <a:t>Top register contains a counter, increments on AXI </a:t>
-            </a:r>
-            <a:r>
-              <a:rPr lang="en-US" dirty="0" err="1" smtClean="0"/>
-              <a:t>clk</a:t>
-            </a:r>
-            <a:endParaRPr lang="en-US" dirty="0"/>
+              <a:t>registers</a:t>
+            </a:r>
+            <a:endParaRPr lang="en-US" dirty="0" smtClean="0"/>
           </a:p>
         </p:txBody>
       </p:sp>

</xml_diff>

<commit_message>
Added conclusion to presentation.
</commit_message>
<xml_diff>
--- a/Presentation/BV_AM_Final_Project_Presentation.pptx
+++ b/Presentation/BV_AM_Final_Project_Presentation.pptx
@@ -6,10 +6,10 @@
     <p:sldMasterId id="2147483658" r:id="rId2"/>
   </p:sldMasterIdLst>
   <p:notesMasterIdLst>
-    <p:notesMasterId r:id="rId15"/>
+    <p:notesMasterId r:id="rId16"/>
   </p:notesMasterIdLst>
   <p:handoutMasterIdLst>
-    <p:handoutMasterId r:id="rId16"/>
+    <p:handoutMasterId r:id="rId17"/>
   </p:handoutMasterIdLst>
   <p:sldIdLst>
     <p:sldId id="281" r:id="rId3"/>
@@ -24,6 +24,7 @@
     <p:sldId id="440" r:id="rId12"/>
     <p:sldId id="439" r:id="rId13"/>
     <p:sldId id="400" r:id="rId14"/>
+    <p:sldId id="444" r:id="rId15"/>
   </p:sldIdLst>
   <p:sldSz cx="9144000" cy="6858000" type="screen4x3"/>
   <p:notesSz cx="7010400" cy="9236075"/>
@@ -169,6 +170,7 @@
             <p14:sldId id="440"/>
             <p14:sldId id="439"/>
             <p14:sldId id="400"/>
+            <p14:sldId id="444"/>
           </p14:sldIdLst>
         </p14:section>
       </p14:sectionLst>
@@ -9399,6 +9401,174 @@
       </p:par>
     </p:tnLst>
   </p:timing>
+</p:sld>
+</file>
+
+<file path=ppt/slides/slide13.xml><?xml version="1.0" encoding="utf-8"?>
+<p:sld xmlns:a="http://schemas.openxmlformats.org/drawingml/2006/main" xmlns:r="http://schemas.openxmlformats.org/officeDocument/2006/relationships" xmlns:p="http://schemas.openxmlformats.org/presentationml/2006/main">
+  <p:cSld>
+    <p:spTree>
+      <p:nvGrpSpPr>
+        <p:cNvPr id="1" name=""/>
+        <p:cNvGrpSpPr/>
+        <p:nvPr/>
+      </p:nvGrpSpPr>
+      <p:grpSpPr>
+        <a:xfrm>
+          <a:off x="0" y="0"/>
+          <a:ext cx="0" cy="0"/>
+          <a:chOff x="0" y="0"/>
+          <a:chExt cx="0" cy="0"/>
+        </a:xfrm>
+      </p:grpSpPr>
+      <p:sp>
+        <p:nvSpPr>
+          <p:cNvPr id="2" name="Title 1"/>
+          <p:cNvSpPr>
+            <a:spLocks noGrp="1"/>
+          </p:cNvSpPr>
+          <p:nvPr>
+            <p:ph type="title"/>
+          </p:nvPr>
+        </p:nvSpPr>
+        <p:spPr/>
+        <p:txBody>
+          <a:bodyPr/>
+          <a:lstStyle/>
+          <a:p>
+            <a:r>
+              <a:rPr lang="en-US" dirty="0" smtClean="0"/>
+              <a:t>Conclusion</a:t>
+            </a:r>
+            <a:endParaRPr lang="en-US" dirty="0"/>
+          </a:p>
+        </p:txBody>
+      </p:sp>
+      <p:sp>
+        <p:nvSpPr>
+          <p:cNvPr id="3" name="Content Placeholder 2"/>
+          <p:cNvSpPr>
+            <a:spLocks noGrp="1"/>
+          </p:cNvSpPr>
+          <p:nvPr>
+            <p:ph idx="1"/>
+          </p:nvPr>
+        </p:nvSpPr>
+        <p:spPr/>
+        <p:txBody>
+          <a:bodyPr/>
+          <a:lstStyle/>
+          <a:p>
+            <a:r>
+              <a:rPr lang="en-US" b="1" u="sng" dirty="0" smtClean="0"/>
+              <a:t>Achievements</a:t>
+            </a:r>
+          </a:p>
+          <a:p>
+            <a:pPr lvl="1"/>
+            <a:r>
+              <a:rPr lang="en-US" dirty="0" smtClean="0"/>
+              <a:t>Researched the various bus-interfacing options available on the Zynq-7000 </a:t>
+            </a:r>
+            <a:r>
+              <a:rPr lang="en-US" dirty="0" err="1" smtClean="0"/>
+              <a:t>SoC</a:t>
+            </a:r>
+            <a:endParaRPr lang="en-US" dirty="0" smtClean="0"/>
+          </a:p>
+          <a:p>
+            <a:pPr lvl="1"/>
+            <a:r>
+              <a:rPr lang="en-US" dirty="0" smtClean="0"/>
+              <a:t>Successfully established AXI bus data transfers between the ARM CPU and the TRNG custom core</a:t>
+            </a:r>
+          </a:p>
+          <a:p>
+            <a:pPr lvl="1"/>
+            <a:r>
+              <a:rPr lang="en-US" dirty="0" smtClean="0"/>
+              <a:t>Tested the impact of several bus transfer modes on throughput</a:t>
+            </a:r>
+          </a:p>
+          <a:p>
+            <a:endParaRPr lang="en-US" dirty="0"/>
+          </a:p>
+          <a:p>
+            <a:r>
+              <a:rPr lang="en-US" b="1" u="sng" dirty="0" smtClean="0"/>
+              <a:t>Possible Future Work</a:t>
+            </a:r>
+          </a:p>
+          <a:p>
+            <a:pPr lvl="1"/>
+            <a:r>
+              <a:rPr lang="en-US" dirty="0" smtClean="0"/>
+              <a:t>Test and compare the TRNG structure on the high speed (streaming) AXI bus interface option as well as the implications on the CPU software side</a:t>
+            </a:r>
+            <a:endParaRPr lang="en-US" dirty="0"/>
+          </a:p>
+        </p:txBody>
+      </p:sp>
+      <p:sp>
+        <p:nvSpPr>
+          <p:cNvPr id="4" name="Date Placeholder 3"/>
+          <p:cNvSpPr>
+            <a:spLocks noGrp="1"/>
+          </p:cNvSpPr>
+          <p:nvPr>
+            <p:ph type="dt" sz="half" idx="10"/>
+          </p:nvPr>
+        </p:nvSpPr>
+        <p:spPr/>
+        <p:txBody>
+          <a:bodyPr/>
+          <a:lstStyle/>
+          <a:p>
+            <a:pPr>
+              <a:defRPr/>
+            </a:pPr>
+            <a:r>
+              <a:rPr lang="en-US" smtClean="0"/>
+              <a:t>Iowa State University</a:t>
+            </a:r>
+            <a:endParaRPr lang="en-US" dirty="0"/>
+          </a:p>
+        </p:txBody>
+      </p:sp>
+      <p:sp>
+        <p:nvSpPr>
+          <p:cNvPr id="5" name="Slide Number Placeholder 4"/>
+          <p:cNvSpPr>
+            <a:spLocks noGrp="1"/>
+          </p:cNvSpPr>
+          <p:nvPr>
+            <p:ph type="sldNum" sz="quarter" idx="12"/>
+          </p:nvPr>
+        </p:nvSpPr>
+        <p:spPr/>
+        <p:txBody>
+          <a:bodyPr/>
+          <a:lstStyle/>
+          <a:p>
+            <a:fld id="{C5486D28-24A8-43BD-8D15-DF2DDB8C758E}" type="slidenum">
+              <a:rPr lang="en-US" smtClean="0"/>
+              <a:pPr/>
+              <a:t>13</a:t>
+            </a:fld>
+            <a:endParaRPr lang="en-US"/>
+          </a:p>
+        </p:txBody>
+      </p:sp>
+    </p:spTree>
+    <p:extLst>
+      <p:ext uri="{BB962C8B-B14F-4D97-AF65-F5344CB8AC3E}">
+        <p14:creationId xmlns:p14="http://schemas.microsoft.com/office/powerpoint/2010/main" val="2038965946"/>
+      </p:ext>
+    </p:extLst>
+  </p:cSld>
+  <p:clrMapOvr>
+    <a:masterClrMapping/>
+  </p:clrMapOvr>
 </p:sld>
 </file>
 

</xml_diff>

<commit_message>
Fixed hidden slides on presentation.
</commit_message>
<xml_diff>
--- a/Presentation/BV_AM_Final_Project_Presentation.pptx
+++ b/Presentation/BV_AM_Final_Project_Presentation.pptx
@@ -9573,7 +9573,7 @@
 </file>
 
 <file path=ppt/slides/slide2.xml><?xml version="1.0" encoding="utf-8"?>
-<p:sld xmlns:a="http://schemas.openxmlformats.org/drawingml/2006/main" xmlns:r="http://schemas.openxmlformats.org/officeDocument/2006/relationships" xmlns:p="http://schemas.openxmlformats.org/presentationml/2006/main" show="0">
+<p:sld xmlns:a="http://schemas.openxmlformats.org/drawingml/2006/main" xmlns:r="http://schemas.openxmlformats.org/officeDocument/2006/relationships" xmlns:p="http://schemas.openxmlformats.org/presentationml/2006/main">
   <p:cSld>
     <p:spTree>
       <p:nvGrpSpPr>
@@ -9854,11 +9854,11 @@
   <p:clrMapOvr>
     <a:masterClrMapping/>
   </p:clrMapOvr>
-  <mc:AlternateContent xmlns:mc="http://schemas.openxmlformats.org/markup-compatibility/2006" xmlns:p14="http://schemas.microsoft.com/office/powerpoint/2010/main">
-    <mc:Choice Requires="p14">
+  <mc:AlternateContent xmlns:mc="http://schemas.openxmlformats.org/markup-compatibility/2006">
+    <mc:Choice xmlns:p14="http://schemas.microsoft.com/office/powerpoint/2010/main" Requires="p14">
       <p:transition spd="slow" p14:dur="2000"/>
     </mc:Choice>
-    <mc:Fallback xmlns="">
+    <mc:Fallback>
       <p:transition spd="slow"/>
     </mc:Fallback>
   </mc:AlternateContent>
@@ -9873,7 +9873,7 @@
 </file>
 
 <file path=ppt/slides/slide3.xml><?xml version="1.0" encoding="utf-8"?>
-<p:sld xmlns:a="http://schemas.openxmlformats.org/drawingml/2006/main" xmlns:r="http://schemas.openxmlformats.org/officeDocument/2006/relationships" xmlns:p="http://schemas.openxmlformats.org/presentationml/2006/main" show="0">
+<p:sld xmlns:a="http://schemas.openxmlformats.org/drawingml/2006/main" xmlns:r="http://schemas.openxmlformats.org/officeDocument/2006/relationships" xmlns:p="http://schemas.openxmlformats.org/presentationml/2006/main">
   <p:cSld>
     <p:spTree>
       <p:nvGrpSpPr>
@@ -10176,11 +10176,11 @@
   <p:clrMapOvr>
     <a:masterClrMapping/>
   </p:clrMapOvr>
-  <mc:AlternateContent xmlns:mc="http://schemas.openxmlformats.org/markup-compatibility/2006" xmlns:p14="http://schemas.microsoft.com/office/powerpoint/2010/main">
-    <mc:Choice Requires="p14">
+  <mc:AlternateContent xmlns:mc="http://schemas.openxmlformats.org/markup-compatibility/2006">
+    <mc:Choice xmlns:p14="http://schemas.microsoft.com/office/powerpoint/2010/main" Requires="p14">
       <p:transition spd="slow" p14:dur="2000"/>
     </mc:Choice>
-    <mc:Fallback xmlns="">
+    <mc:Fallback>
       <p:transition spd="slow"/>
     </mc:Fallback>
   </mc:AlternateContent>
@@ -11022,7 +11022,7 @@
 </file>
 
 <file path=ppt/slides/slide8.xml><?xml version="1.0" encoding="utf-8"?>
-<p:sld xmlns:a="http://schemas.openxmlformats.org/drawingml/2006/main" xmlns:r="http://schemas.openxmlformats.org/officeDocument/2006/relationships" xmlns:p="http://schemas.openxmlformats.org/presentationml/2006/main" show="0">
+<p:sld xmlns:a="http://schemas.openxmlformats.org/drawingml/2006/main" xmlns:r="http://schemas.openxmlformats.org/officeDocument/2006/relationships" xmlns:p="http://schemas.openxmlformats.org/presentationml/2006/main">
   <p:cSld>
     <p:spTree>
       <p:nvGrpSpPr>
@@ -11501,11 +11501,11 @@
   <p:clrMapOvr>
     <a:masterClrMapping/>
   </p:clrMapOvr>
-  <mc:AlternateContent xmlns:mc="http://schemas.openxmlformats.org/markup-compatibility/2006" xmlns:p14="http://schemas.microsoft.com/office/powerpoint/2010/main">
-    <mc:Choice Requires="p14">
+  <mc:AlternateContent xmlns:mc="http://schemas.openxmlformats.org/markup-compatibility/2006">
+    <mc:Choice xmlns:p14="http://schemas.microsoft.com/office/powerpoint/2010/main" Requires="p14">
       <p:transition spd="slow" p14:dur="2000"/>
     </mc:Choice>
-    <mc:Fallback xmlns="">
+    <mc:Fallback>
       <p:transition spd="slow"/>
     </mc:Fallback>
   </mc:AlternateContent>

</xml_diff>